<commit_message>
v1.25 doc et setup
</commit_message>
<xml_diff>
--- a/Documentation/Technique/swSSO-Documentation technique.pptx
+++ b/Documentation/Technique/swSSO-Documentation technique.pptx
@@ -118,10 +118,6 @@
     </p:ext>
   </p:extLst>
 </p:presentation>
-</file>
-
-<file path=ppt/revisionInfo.xml><?xml version="1.0" encoding="utf-8"?>
-<p1510:revInfo xmlns:a="http://schemas.openxmlformats.org/drawingml/2006/main" xmlns:r="http://schemas.openxmlformats.org/officeDocument/2006/relationships" xmlns:p1510="http://schemas.microsoft.com/office/powerpoint/2015/10/main"/>
 </file>
 
 <file path=ppt/handoutMasters/handoutMaster1.xml><?xml version="1.0" encoding="utf-8"?>
@@ -10504,7 +10500,7 @@
               <a:tabLst/>
             </a:pPr>
             <a:r>
-              <a:rPr lang="fr-FR" sz="1200" b="0" i="0" u="none" strike="noStrike" kern="1200">
+              <a:rPr lang="fr-FR" sz="1100" b="0" i="0" u="none" strike="noStrike" kern="1200" dirty="0">
                 <a:ln>
                   <a:noFill/>
                 </a:ln>
@@ -10530,7 +10526,46 @@
               <a:tabLst/>
             </a:pPr>
             <a:r>
-              <a:rPr lang="fr-FR" sz="1200" b="0" i="0" u="none" strike="noStrike" kern="1200">
+              <a:rPr lang="fr-FR" sz="1100" dirty="0">
+                <a:latin typeface="Arial" pitchFamily="18"/>
+                <a:ea typeface="Arial Unicode MS" pitchFamily="2"/>
+                <a:cs typeface="Mangal" pitchFamily="2"/>
+              </a:rPr>
+              <a:t>HMAC-SHA256</a:t>
+            </a:r>
+            <a:endParaRPr lang="fr-FR" sz="1100" b="0" i="0" u="none" strike="noStrike" kern="1200" dirty="0">
+              <a:ln>
+                <a:noFill/>
+              </a:ln>
+              <a:latin typeface="Arial" pitchFamily="18"/>
+              <a:ea typeface="Arial Unicode MS" pitchFamily="2"/>
+              <a:cs typeface="Mangal" pitchFamily="2"/>
+            </a:endParaRPr>
+          </a:p>
+          <a:p>
+            <a:pPr marL="0" marR="0" lvl="0" indent="0" algn="ctr" hangingPunct="0">
+              <a:lnSpc>
+                <a:spcPct val="100000"/>
+              </a:lnSpc>
+              <a:spcBef>
+                <a:spcPts val="0"/>
+              </a:spcBef>
+              <a:spcAft>
+                <a:spcPts val="0"/>
+              </a:spcAft>
+              <a:buNone/>
+              <a:tabLst/>
+            </a:pPr>
+            <a:r>
+              <a:rPr lang="fr-FR" sz="1100" dirty="0">
+                <a:latin typeface="Arial" pitchFamily="18"/>
+                <a:ea typeface="Arial Unicode MS" pitchFamily="2"/>
+                <a:cs typeface="Mangal" pitchFamily="2"/>
+              </a:rPr>
+              <a:t>60</a:t>
+            </a:r>
+            <a:r>
+              <a:rPr lang="fr-FR" sz="1100" b="0" i="0" u="none" strike="noStrike" kern="1200" dirty="0">
                 <a:ln>
                   <a:noFill/>
                 </a:ln>
@@ -10538,10 +10573,10 @@
                 <a:ea typeface="Arial Unicode MS" pitchFamily="2"/>
                 <a:cs typeface="Mangal" pitchFamily="2"/>
               </a:rPr>
-              <a:t>10.000 </a:t>
+              <a:t>0.000 </a:t>
             </a:r>
             <a:br>
-              <a:rPr lang="fr-FR" sz="1200" b="0" i="0" u="none" strike="noStrike" kern="1200">
+              <a:rPr lang="fr-FR" sz="1100" b="0" i="0" u="none" strike="noStrike" kern="1200" dirty="0">
                 <a:ln>
                   <a:noFill/>
                 </a:ln>
@@ -10551,7 +10586,7 @@
               </a:rPr>
             </a:br>
             <a:r>
-              <a:rPr lang="fr-FR" sz="1200" b="0" i="0" u="none" strike="noStrike" kern="1200">
+              <a:rPr lang="fr-FR" sz="1100" b="0" i="0" u="none" strike="noStrike" kern="1200" dirty="0">
                 <a:ln>
                   <a:noFill/>
                 </a:ln>
@@ -10634,7 +10669,7 @@
           <a:bodyPr wrap="none" lIns="90000" tIns="45000" rIns="90000" bIns="45000" anchor="ctr" anchorCtr="1" compatLnSpc="0"/>
           <a:lstStyle/>
           <a:p>
-            <a:pPr marL="0" marR="0" lvl="0" indent="0" algn="ctr" hangingPunct="0">
+            <a:pPr marL="0" marR="0" lvl="0" indent="0" algn="ctr" defTabSz="914400" rtl="0" eaLnBrk="1" fontAlgn="auto" latinLnBrk="0" hangingPunct="0">
               <a:lnSpc>
                 <a:spcPct val="100000"/>
               </a:lnSpc>
@@ -10644,17 +10679,24 @@
               <a:spcAft>
                 <a:spcPts val="0"/>
               </a:spcAft>
+              <a:buClrTx/>
+              <a:buSzTx/>
+              <a:buFontTx/>
               <a:buNone/>
               <a:tabLst/>
+              <a:defRPr/>
             </a:pPr>
             <a:r>
-              <a:rPr lang="fr-FR" sz="1200" b="0" i="0" u="none" strike="noStrike" kern="1200">
+              <a:rPr kumimoji="0" lang="fr-FR" sz="1100" b="0" i="0" u="none" strike="noStrike" kern="1200" cap="none" spc="0" normalizeH="0" baseline="0" noProof="0" dirty="0">
                 <a:ln>
                   <a:noFill/>
                 </a:ln>
                 <a:solidFill>
-                  <a:srgbClr val="000000"/>
+                  <a:prstClr val="black"/>
                 </a:solidFill>
+                <a:effectLst/>
+                <a:uLnTx/>
+                <a:uFillTx/>
                 <a:latin typeface="Arial" pitchFamily="18"/>
                 <a:ea typeface="Arial Unicode MS" pitchFamily="2"/>
                 <a:cs typeface="Mangal" pitchFamily="2"/>
@@ -10663,7 +10705,7 @@
             </a:r>
           </a:p>
           <a:p>
-            <a:pPr marL="0" marR="0" lvl="0" indent="0" algn="ctr" hangingPunct="0">
+            <a:pPr marL="0" marR="0" lvl="0" indent="0" algn="ctr" defTabSz="914400" rtl="0" eaLnBrk="1" fontAlgn="auto" latinLnBrk="0" hangingPunct="0">
               <a:lnSpc>
                 <a:spcPct val="100000"/>
               </a:lnSpc>
@@ -10673,35 +10715,93 @@
               <a:spcAft>
                 <a:spcPts val="0"/>
               </a:spcAft>
+              <a:buClrTx/>
+              <a:buSzTx/>
+              <a:buFontTx/>
               <a:buNone/>
               <a:tabLst/>
+              <a:defRPr/>
             </a:pPr>
             <a:r>
-              <a:rPr lang="fr-FR" sz="1200" b="0" i="0" u="none" strike="noStrike" kern="1200">
+              <a:rPr kumimoji="0" lang="fr-FR" sz="1100" b="0" i="0" u="none" strike="noStrike" kern="1200" cap="none" spc="0" normalizeH="0" baseline="0" noProof="0" dirty="0">
                 <a:ln>
                   <a:noFill/>
                 </a:ln>
+                <a:solidFill>
+                  <a:prstClr val="black"/>
+                </a:solidFill>
+                <a:effectLst/>
+                <a:uLnTx/>
+                <a:uFillTx/>
                 <a:latin typeface="Arial" pitchFamily="18"/>
                 <a:ea typeface="Arial Unicode MS" pitchFamily="2"/>
                 <a:cs typeface="Mangal" pitchFamily="2"/>
               </a:rPr>
-              <a:t>10.000 </a:t>
-            </a:r>
-            <a:br>
-              <a:rPr lang="fr-FR" sz="1200" b="0" i="0" u="none" strike="noStrike" kern="1200">
+              <a:t>HMAC-SHA256</a:t>
+            </a:r>
+          </a:p>
+          <a:p>
+            <a:pPr marL="0" marR="0" lvl="0" indent="0" algn="ctr" defTabSz="914400" rtl="0" eaLnBrk="1" fontAlgn="auto" latinLnBrk="0" hangingPunct="0">
+              <a:lnSpc>
+                <a:spcPct val="100000"/>
+              </a:lnSpc>
+              <a:spcBef>
+                <a:spcPts val="0"/>
+              </a:spcBef>
+              <a:spcAft>
+                <a:spcPts val="0"/>
+              </a:spcAft>
+              <a:buClrTx/>
+              <a:buSzTx/>
+              <a:buFontTx/>
+              <a:buNone/>
+              <a:tabLst/>
+              <a:defRPr/>
+            </a:pPr>
+            <a:r>
+              <a:rPr kumimoji="0" lang="fr-FR" sz="1100" b="0" i="0" u="none" strike="noStrike" kern="1200" cap="none" spc="0" normalizeH="0" baseline="0" noProof="0" dirty="0">
                 <a:ln>
                   <a:noFill/>
                 </a:ln>
+                <a:solidFill>
+                  <a:prstClr val="black"/>
+                </a:solidFill>
+                <a:effectLst/>
+                <a:uLnTx/>
+                <a:uFillTx/>
+                <a:latin typeface="Arial" pitchFamily="18"/>
+                <a:ea typeface="Arial Unicode MS" pitchFamily="2"/>
+                <a:cs typeface="Mangal" pitchFamily="2"/>
+              </a:rPr>
+              <a:t>600.000 </a:t>
+            </a:r>
+            <a:br>
+              <a:rPr kumimoji="0" lang="fr-FR" sz="1100" b="0" i="0" u="none" strike="noStrike" kern="1200" cap="none" spc="0" normalizeH="0" baseline="0" noProof="0" dirty="0">
+                <a:ln>
+                  <a:noFill/>
+                </a:ln>
+                <a:solidFill>
+                  <a:prstClr val="black"/>
+                </a:solidFill>
+                <a:effectLst/>
+                <a:uLnTx/>
+                <a:uFillTx/>
                 <a:latin typeface="Arial" pitchFamily="18"/>
                 <a:ea typeface="Arial Unicode MS" pitchFamily="2"/>
                 <a:cs typeface="Mangal" pitchFamily="2"/>
               </a:rPr>
             </a:br>
             <a:r>
-              <a:rPr lang="fr-FR" sz="1200" b="0" i="0" u="none" strike="noStrike" kern="1200">
+              <a:rPr kumimoji="0" lang="fr-FR" sz="1100" b="0" i="0" u="none" strike="noStrike" kern="1200" cap="none" spc="0" normalizeH="0" baseline="0" noProof="0" dirty="0">
                 <a:ln>
                   <a:noFill/>
                 </a:ln>
+                <a:solidFill>
+                  <a:prstClr val="black"/>
+                </a:solidFill>
+                <a:effectLst/>
+                <a:uLnTx/>
+                <a:uFillTx/>
                 <a:latin typeface="Arial" pitchFamily="18"/>
                 <a:ea typeface="Arial Unicode MS" pitchFamily="2"/>
                 <a:cs typeface="Mangal" pitchFamily="2"/>

</xml_diff>